<commit_message>
welcome slide + song slides done
</commit_message>
<xml_diff>
--- a/presentation.pptx
+++ b/presentation.pptx
@@ -576,7 +576,7 @@
 
 <file path=ppt/slideLayouts/slideLayout2.xml><?xml version="1.0" encoding="utf-8"?>
 <p:sldLayout xmlns:a="http://schemas.openxmlformats.org/drawingml/2006/main" xmlns:r="http://schemas.openxmlformats.org/officeDocument/2006/relationships" xmlns:p="http://schemas.openxmlformats.org/presentationml/2006/main" preserve="1">
-  <p:cSld name="SONG_SLIDE_LAYOUT">
+  <p:cSld name="SONG_SLIDE_TITLE_LAYOUT">
     <p:bg>
       <p:bgPr>
         <a:solidFill>
@@ -602,12 +602,14 @@
         <p:nvSpPr>
           <p:cNvPr id="2" name="Text 0"/>
           <p:cNvSpPr/>
-          <p:nvPr/>
+          <p:nvPr>
+            <p:ph idx="100" type="body" hasCustomPrompt="1"/>
+          </p:nvPr>
         </p:nvSpPr>
         <p:spPr>
           <a:xfrm>
-            <a:off x="0" y="914400"/>
-            <a:ext cx="9144000" cy="1828800"/>
+            <a:off x="0" y="2743200"/>
+            <a:ext cx="9144000" cy="914400"/>
           </a:xfrm>
           <a:prstGeom prst="rect">
             <a:avLst/>
@@ -616,34 +618,45 @@
           <a:ln/>
         </p:spPr>
         <p:txBody>
-          <a:bodyPr wrap="square" rtlCol="0" anchor="ctr"/>
-          <a:lstStyle/>
+          <a:bodyPr wrap="square" rtlCol="0"/>
+          <a:lstStyle>
+            <a:lvl1pPr algn="ctr" indent="0" marL="0">
+              <a:buNone/>
+              <a:defRPr lang="en-US" sz="1800" dirty="0">
+                <a:solidFill>
+                  <a:srgbClr val="A9A9A9"/>
+                </a:solidFill>
+              </a:defRPr>
+            </a:lvl1pPr>
+          </a:lstStyle>
           <a:p>
             <a:pPr algn="ctr" indent="0" marL="0">
               <a:buNone/>
             </a:pPr>
             <a:r>
-              <a:rPr lang="en-US" sz="2400" dirty="0">
-                <a:solidFill>
-                  <a:srgbClr val="000000"/>
+              <a:rPr lang="en-US" sz="1800" dirty="0">
+                <a:solidFill>
+                  <a:srgbClr val="A9A9A9"/>
                 </a:solidFill>
               </a:rPr>
-              <a:t>Title Text</a:t>
-            </a:r>
-            <a:endParaRPr lang="en-US" sz="2400" dirty="0"/>
-          </a:p>
-        </p:txBody>
-      </p:sp>
-      <p:sp>
-        <p:nvSpPr>
-          <p:cNvPr id="3" name="Text 1"/>
+              <a:t>Song Author Here</a:t>
+            </a:r>
+            <a:endParaRPr lang="en-US" sz="1800" dirty="0"/>
+          </a:p>
+        </p:txBody>
+      </p:sp>
+      <p:sp>
+        <p:nvSpPr>
+          <p:cNvPr id="3" name="Text 0"/>
           <p:cNvSpPr/>
-          <p:nvPr/>
+          <p:nvPr>
+            <p:ph idx="101" type="body" hasCustomPrompt="1"/>
+          </p:nvPr>
         </p:nvSpPr>
         <p:spPr>
           <a:xfrm>
-            <a:off x="914400" y="2743200"/>
-            <a:ext cx="8229600" cy="914400"/>
+            <a:off x="0" y="2057400"/>
+            <a:ext cx="9144000" cy="914400"/>
           </a:xfrm>
           <a:prstGeom prst="rect">
             <a:avLst/>
@@ -652,21 +665,81 @@
           <a:ln/>
         </p:spPr>
         <p:txBody>
-          <a:bodyPr wrap="square" rtlCol="0" anchor="ctr"/>
-          <a:lstStyle/>
-          <a:p>
-            <a:pPr indent="0" marL="0">
+          <a:bodyPr wrap="square" rtlCol="0"/>
+          <a:lstStyle>
+            <a:lvl1pPr algn="ctr" indent="0" marL="0">
+              <a:buNone/>
+              <a:defRPr lang="en-US" sz="4000" dirty="0">
+                <a:solidFill>
+                  <a:srgbClr val="548135"/>
+                </a:solidFill>
+              </a:defRPr>
+            </a:lvl1pPr>
+          </a:lstStyle>
+          <a:p>
+            <a:pPr algn="ctr" indent="0" marL="0">
               <a:buNone/>
             </a:pPr>
             <a:r>
-              <a:rPr lang="en-US" sz="1200" dirty="0">
-                <a:solidFill>
-                  <a:srgbClr val="000000"/>
+              <a:rPr lang="en-US" sz="4000" dirty="0">
+                <a:solidFill>
+                  <a:srgbClr val="548135"/>
                 </a:solidFill>
               </a:rPr>
-              <a:t>testing</a:t>
-            </a:r>
-            <a:endParaRPr lang="en-US" sz="1200" dirty="0"/>
+              <a:t>Song Title Here</a:t>
+            </a:r>
+            <a:endParaRPr lang="en-US" sz="4000" dirty="0"/>
+          </a:p>
+        </p:txBody>
+      </p:sp>
+      <p:sp>
+        <p:nvSpPr>
+          <p:cNvPr id="4" name="Text 0"/>
+          <p:cNvSpPr/>
+          <p:nvPr>
+            <p:ph idx="102" type="body" hasCustomPrompt="1"/>
+          </p:nvPr>
+        </p:nvSpPr>
+        <p:spPr>
+          <a:xfrm>
+            <a:off x="0" y="0"/>
+            <a:ext cx="9144000" cy="5143500"/>
+          </a:xfrm>
+          <a:prstGeom prst="rect">
+            <a:avLst/>
+          </a:prstGeom>
+          <a:noFill/>
+          <a:ln/>
+        </p:spPr>
+        <p:txBody>
+          <a:bodyPr wrap="square" rtlCol="0"/>
+          <a:lstStyle>
+            <a:lvl1pPr algn="ctr" indent="0" marL="0">
+              <a:buNone/>
+              <a:defRPr lang="en-US" sz="30000" dirty="0">
+                <a:solidFill>
+                  <a:srgbClr val="548135">
+                    <a:alpha val="20000"/>
+                  </a:srgbClr>
+                </a:solidFill>
+              </a:defRPr>
+            </a:lvl1pPr>
+          </a:lstStyle>
+          <a:p>
+            <a:pPr algn="ctr" indent="0" marL="0">
+              <a:buNone/>
+            </a:pPr>
+            <a:r>
+              <a:rPr lang="en-US" sz="30000" dirty="0">
+                <a:solidFill>
+                  <a:srgbClr val="548135">
+                    <a:alpha val="20000"/>
+                  </a:srgbClr>
+                </a:solidFill>
+              </a:rPr>
+              <a:t>1</a:t>
+            </a:r>
+            <a:endParaRPr lang="en-US" sz="30000" dirty="0"/>
           </a:p>
         </p:txBody>
       </p:sp>
@@ -718,7 +791,7 @@
         <p:spPr>
           <a:xfrm>
             <a:off x="457200" y="1463040"/>
-            <a:ext cx="9144000" cy="914400"/>
+            <a:ext cx="2743200" cy="914400"/>
           </a:xfrm>
           <a:prstGeom prst="rect">
             <a:avLst/>
@@ -734,14 +807,14 @@
               <a:buNone/>
             </a:pPr>
             <a:r>
-              <a:rPr lang="en-US" sz="1800" dirty="0">
+              <a:rPr lang="en-US" sz="2800" dirty="0">
                 <a:solidFill>
                   <a:srgbClr val="F5F6F7"/>
                 </a:solidFill>
               </a:rPr>
               <a:t>22 February 2025</a:t>
             </a:r>
-            <a:endParaRPr lang="en-US" sz="1800" dirty="0"/>
+            <a:endParaRPr lang="en-US" sz="2800" dirty="0"/>
           </a:p>
         </p:txBody>
       </p:sp>
@@ -778,6 +851,262 @@
               <a:t>Welcome to Remaja</a:t>
             </a:r>
             <a:endParaRPr lang="en-US" sz="6000" dirty="0"/>
+          </a:p>
+        </p:txBody>
+      </p:sp>
+      <p:sp>
+        <p:nvSpPr>
+          <p:cNvPr id="4" name="Text 2"/>
+          <p:cNvSpPr/>
+          <p:nvPr/>
+        </p:nvSpPr>
+        <p:spPr>
+          <a:xfrm>
+            <a:off x="0" y="4343400"/>
+            <a:ext cx="9144000" cy="914400"/>
+          </a:xfrm>
+          <a:prstGeom prst="rect">
+            <a:avLst/>
+          </a:prstGeom>
+          <a:noFill/>
+          <a:ln/>
+        </p:spPr>
+        <p:txBody>
+          <a:bodyPr wrap="square" rtlCol="0" anchor="ctr"/>
+          <a:lstStyle/>
+          <a:p>
+            <a:pPr algn="ctr" indent="0" marL="0">
+              <a:buNone/>
+            </a:pPr>
+            <a:r>
+              <a:rPr lang="en-US" sz="1800" dirty="0">
+                <a:solidFill>
+                  <a:srgbClr val="6B7A90"/>
+                </a:solidFill>
+              </a:rPr>
+              <a:t>Reformed Evangelical Church Singapore</a:t>
+            </a:r>
+            <a:endParaRPr lang="en-US" sz="1800" dirty="0"/>
+          </a:p>
+        </p:txBody>
+      </p:sp>
+    </p:spTree>
+  </p:cSld>
+  <p:clrMapOvr>
+    <a:masterClrMapping/>
+  </p:clrMapOvr>
+</p:sldLayout>
+</file>
+
+<file path=ppt/slideLayouts/slideLayout4.xml><?xml version="1.0" encoding="utf-8"?>
+<p:sldLayout xmlns:a="http://schemas.openxmlformats.org/drawingml/2006/main" xmlns:r="http://schemas.openxmlformats.org/officeDocument/2006/relationships" xmlns:p="http://schemas.openxmlformats.org/presentationml/2006/main" preserve="1">
+  <p:cSld name="SONG_SLIDE_LAYOUT">
+    <p:bg>
+      <p:bgPr>
+        <a:solidFill>
+          <a:srgbClr val="FFFFFF"/>
+        </a:solidFill>
+      </p:bgPr>
+    </p:bg>
+    <p:spTree>
+      <p:nvGrpSpPr>
+        <p:cNvPr id="1" name=""/>
+        <p:cNvGrpSpPr/>
+        <p:nvPr/>
+      </p:nvGrpSpPr>
+      <p:grpSpPr>
+        <a:xfrm>
+          <a:off x="0" y="0"/>
+          <a:ext cx="0" cy="0"/>
+          <a:chOff x="0" y="0"/>
+          <a:chExt cx="0" cy="0"/>
+        </a:xfrm>
+      </p:grpSpPr>
+      <p:sp>
+        <p:nvSpPr>
+          <p:cNvPr id="2" name="Text 0"/>
+          <p:cNvSpPr/>
+          <p:nvPr>
+            <p:ph idx="100" type="body" hasCustomPrompt="1"/>
+          </p:nvPr>
+        </p:nvSpPr>
+        <p:spPr>
+          <a:xfrm>
+            <a:off x="0" y="228600"/>
+            <a:ext cx="9144000" cy="914400"/>
+          </a:xfrm>
+          <a:prstGeom prst="rect">
+            <a:avLst/>
+          </a:prstGeom>
+          <a:noFill/>
+          <a:ln/>
+        </p:spPr>
+        <p:txBody>
+          <a:bodyPr wrap="square" rtlCol="0"/>
+          <a:lstStyle>
+            <a:lvl1pPr algn="ctr" indent="0" marL="0">
+              <a:buNone/>
+              <a:defRPr lang="en-US" sz="4000" dirty="0">
+                <a:solidFill>
+                  <a:srgbClr val="548135"/>
+                </a:solidFill>
+              </a:defRPr>
+            </a:lvl1pPr>
+          </a:lstStyle>
+          <a:p>
+            <a:pPr algn="ctr" indent="0" marL="0">
+              <a:buNone/>
+            </a:pPr>
+            <a:r>
+              <a:rPr lang="en-US" sz="4000" dirty="0">
+                <a:solidFill>
+                  <a:srgbClr val="548135"/>
+                </a:solidFill>
+              </a:rPr>
+              <a:t>Song Title Here</a:t>
+            </a:r>
+            <a:endParaRPr lang="en-US" sz="4000" dirty="0"/>
+          </a:p>
+        </p:txBody>
+      </p:sp>
+      <p:sp>
+        <p:nvSpPr>
+          <p:cNvPr id="3" name="Text 0"/>
+          <p:cNvSpPr/>
+          <p:nvPr>
+            <p:ph idx="101" type="body" hasCustomPrompt="1"/>
+          </p:nvPr>
+        </p:nvSpPr>
+        <p:spPr>
+          <a:xfrm>
+            <a:off x="0" y="914400"/>
+            <a:ext cx="9144000" cy="457200"/>
+          </a:xfrm>
+          <a:prstGeom prst="rect">
+            <a:avLst/>
+          </a:prstGeom>
+          <a:noFill/>
+          <a:ln/>
+        </p:spPr>
+        <p:txBody>
+          <a:bodyPr wrap="square" rtlCol="0"/>
+          <a:lstStyle>
+            <a:lvl1pPr algn="ctr" indent="0" marL="0">
+              <a:buNone/>
+              <a:defRPr lang="en-US" sz="1800" dirty="0">
+                <a:solidFill>
+                  <a:srgbClr val="A9A9A9"/>
+                </a:solidFill>
+              </a:defRPr>
+            </a:lvl1pPr>
+          </a:lstStyle>
+          <a:p>
+            <a:pPr algn="ctr" indent="0" marL="0">
+              <a:buNone/>
+            </a:pPr>
+            <a:r>
+              <a:rPr lang="en-US" sz="1800" dirty="0">
+                <a:solidFill>
+                  <a:srgbClr val="A9A9A9"/>
+                </a:solidFill>
+              </a:rPr>
+              <a:t>Song Author Here</a:t>
+            </a:r>
+            <a:endParaRPr lang="en-US" sz="1800" dirty="0"/>
+          </a:p>
+        </p:txBody>
+      </p:sp>
+      <p:sp>
+        <p:nvSpPr>
+          <p:cNvPr id="4" name="Text 0"/>
+          <p:cNvSpPr/>
+          <p:nvPr>
+            <p:ph idx="102" type="body" hasCustomPrompt="1"/>
+          </p:nvPr>
+        </p:nvSpPr>
+        <p:spPr>
+          <a:xfrm>
+            <a:off x="457200" y="1371600"/>
+            <a:ext cx="8686800" cy="3200400"/>
+          </a:xfrm>
+          <a:prstGeom prst="rect">
+            <a:avLst/>
+          </a:prstGeom>
+          <a:noFill/>
+          <a:ln/>
+        </p:spPr>
+        <p:txBody>
+          <a:bodyPr wrap="square" rtlCol="0"/>
+          <a:lstStyle>
+            <a:lvl1pPr indent="0" marL="0">
+              <a:buNone/>
+              <a:defRPr lang="en-US" sz="2400" dirty="0">
+                <a:solidFill>
+                  <a:srgbClr val="000000"/>
+                </a:solidFill>
+              </a:defRPr>
+            </a:lvl1pPr>
+          </a:lstStyle>
+          <a:p>
+            <a:pPr indent="0" marL="0">
+              <a:buNone/>
+            </a:pPr>
+            <a:r>
+              <a:rPr lang="en-US" sz="2400" dirty="0">
+                <a:solidFill>
+                  <a:srgbClr val="000000"/>
+                </a:solidFill>
+              </a:rPr>
+              <a:t>Song Lyrics Here</a:t>
+            </a:r>
+            <a:endParaRPr lang="en-US" sz="2400" dirty="0"/>
+          </a:p>
+        </p:txBody>
+      </p:sp>
+      <p:sp>
+        <p:nvSpPr>
+          <p:cNvPr id="5" name="Text 0"/>
+          <p:cNvSpPr/>
+          <p:nvPr>
+            <p:ph idx="103" type="body" hasCustomPrompt="1"/>
+          </p:nvPr>
+        </p:nvSpPr>
+        <p:spPr>
+          <a:xfrm>
+            <a:off x="0" y="4297680"/>
+            <a:ext cx="9144000" cy="914400"/>
+          </a:xfrm>
+          <a:prstGeom prst="rect">
+            <a:avLst/>
+          </a:prstGeom>
+          <a:noFill/>
+          <a:ln/>
+        </p:spPr>
+        <p:txBody>
+          <a:bodyPr wrap="square" rtlCol="0"/>
+          <a:lstStyle>
+            <a:lvl1pPr algn="ctr" indent="0" marL="0">
+              <a:buNone/>
+              <a:defRPr lang="en-US" sz="2800" dirty="0">
+                <a:solidFill>
+                  <a:srgbClr val="548135"/>
+                </a:solidFill>
+              </a:defRPr>
+            </a:lvl1pPr>
+          </a:lstStyle>
+          <a:p>
+            <a:pPr algn="ctr" indent="0" marL="0">
+              <a:buNone/>
+            </a:pPr>
+            <a:r>
+              <a:rPr lang="en-US" sz="2800" dirty="0">
+                <a:solidFill>
+                  <a:srgbClr val="548135"/>
+                </a:solidFill>
+              </a:rPr>
+              <a:t>Song Number Here</a:t>
+            </a:r>
+            <a:endParaRPr lang="en-US" sz="2800" dirty="0"/>
           </a:p>
         </p:txBody>
       </p:sp>
@@ -813,6 +1142,7 @@
     <p:sldLayoutId id="2147483649" r:id="rId1"/>
     <p:sldLayoutId id="2147483650" r:id="rId2"/>
     <p:sldLayoutId id="2147483651" r:id="rId3"/>
+    <p:sldLayoutId id="2147483652" r:id="rId4"/>
   </p:sldLayoutIdLst>
   <p:hf sldNum="0" hdr="0" ftr="0" dt="0"/>
   <p:txStyles>
@@ -1085,6 +1415,200 @@
           <a:chExt cx="0" cy="0"/>
         </a:xfrm>
       </p:grpSpPr>
+      <p:sp>
+        <p:nvSpPr>
+          <p:cNvPr id="2" name="Text 0"/>
+          <p:cNvSpPr/>
+          <p:nvPr>
+            <p:ph idx="100" type="body" hasCustomPrompt="1"/>
+          </p:nvPr>
+        </p:nvSpPr>
+        <p:spPr>
+          <a:xfrm>
+            <a:off x="0" y="228600"/>
+            <a:ext cx="9144000" cy="914400"/>
+          </a:xfrm>
+          <a:prstGeom prst="rect">
+            <a:avLst/>
+          </a:prstGeom>
+          <a:noFill/>
+          <a:ln/>
+        </p:spPr>
+        <p:txBody>
+          <a:bodyPr wrap="square" rtlCol="0"/>
+          <a:lstStyle/>
+          <a:p>
+            <a:pPr algn="ctr" indent="0" marL="0">
+              <a:buNone/>
+            </a:pPr>
+            <a:r>
+              <a:rPr lang="en-US" sz="4000" dirty="0">
+                <a:solidFill>
+                  <a:srgbClr val="548135"/>
+                </a:solidFill>
+              </a:rPr>
+              <a:t>How Great Thou Art</a:t>
+            </a:r>
+            <a:endParaRPr lang="en-US" sz="4000" dirty="0"/>
+          </a:p>
+        </p:txBody>
+      </p:sp>
+      <p:sp>
+        <p:nvSpPr>
+          <p:cNvPr id="3" name="Text 0"/>
+          <p:cNvSpPr/>
+          <p:nvPr>
+            <p:ph idx="101" type="body" hasCustomPrompt="1"/>
+          </p:nvPr>
+        </p:nvSpPr>
+        <p:spPr>
+          <a:xfrm>
+            <a:off x="0" y="914400"/>
+            <a:ext cx="9144000" cy="457200"/>
+          </a:xfrm>
+          <a:prstGeom prst="rect">
+            <a:avLst/>
+          </a:prstGeom>
+          <a:noFill/>
+          <a:ln/>
+        </p:spPr>
+        <p:txBody>
+          <a:bodyPr wrap="square" rtlCol="0"/>
+          <a:lstStyle/>
+          <a:p>
+            <a:pPr algn="ctr" indent="0" marL="0">
+              <a:buNone/>
+            </a:pPr>
+            <a:r>
+              <a:rPr lang="en-US" sz="1800" dirty="0">
+                <a:solidFill>
+                  <a:srgbClr val="A9A9A9"/>
+                </a:solidFill>
+              </a:rPr>
+              <a:t>Carl Rob</a:t>
+            </a:r>
+            <a:endParaRPr lang="en-US" sz="1800" dirty="0"/>
+          </a:p>
+        </p:txBody>
+      </p:sp>
+      <p:sp>
+        <p:nvSpPr>
+          <p:cNvPr id="4" name="Text 0"/>
+          <p:cNvSpPr/>
+          <p:nvPr>
+            <p:ph idx="102" type="body" hasCustomPrompt="1"/>
+          </p:nvPr>
+        </p:nvSpPr>
+        <p:spPr>
+          <a:xfrm>
+            <a:off x="457200" y="1371600"/>
+            <a:ext cx="8686800" cy="3200400"/>
+          </a:xfrm>
+          <a:prstGeom prst="rect">
+            <a:avLst/>
+          </a:prstGeom>
+          <a:noFill/>
+          <a:ln/>
+        </p:spPr>
+        <p:txBody>
+          <a:bodyPr wrap="square" rtlCol="0"/>
+          <a:lstStyle/>
+          <a:p>
+            <a:pPr indent="0" marL="0">
+              <a:buNone/>
+            </a:pPr>
+            <a:r>
+              <a:rPr lang="en-US" sz="2400" dirty="0">
+                <a:solidFill>
+                  <a:srgbClr val="000000"/>
+                </a:solidFill>
+              </a:rPr>
+              <a:t>O Lord my God, when I in awesome wonder</a:t>
+            </a:r>
+            <a:endParaRPr lang="en-US" sz="2400" dirty="0"/>
+          </a:p>
+          <a:p>
+            <a:pPr indent="0" marL="0">
+              <a:buNone/>
+            </a:pPr>
+            <a:r>
+              <a:rPr lang="en-US" sz="2400" dirty="0">
+                <a:solidFill>
+                  <a:srgbClr val="000000"/>
+                </a:solidFill>
+              </a:rPr>
+              <a:t>Consider all the worlds Thy hands have made</a:t>
+            </a:r>
+            <a:endParaRPr lang="en-US" sz="2400" dirty="0"/>
+          </a:p>
+          <a:p>
+            <a:pPr indent="0" marL="0">
+              <a:buNone/>
+            </a:pPr>
+            <a:r>
+              <a:rPr lang="en-US" sz="2400" dirty="0">
+                <a:solidFill>
+                  <a:srgbClr val="000000"/>
+                </a:solidFill>
+              </a:rPr>
+              <a:t>I see the stars, I hear the rolling thunder,</a:t>
+            </a:r>
+            <a:endParaRPr lang="en-US" sz="2400" dirty="0"/>
+          </a:p>
+          <a:p>
+            <a:pPr indent="0" marL="0">
+              <a:buNone/>
+            </a:pPr>
+            <a:r>
+              <a:rPr lang="en-US" sz="2400" dirty="0">
+                <a:solidFill>
+                  <a:srgbClr val="000000"/>
+                </a:solidFill>
+              </a:rPr>
+              <a:t>Thy power throughout the universe displayed.</a:t>
+            </a:r>
+            <a:endParaRPr lang="en-US" sz="2400" dirty="0"/>
+          </a:p>
+        </p:txBody>
+      </p:sp>
+      <p:sp>
+        <p:nvSpPr>
+          <p:cNvPr id="5" name="Text 0"/>
+          <p:cNvSpPr/>
+          <p:nvPr>
+            <p:ph idx="103" type="body" hasCustomPrompt="1"/>
+          </p:nvPr>
+        </p:nvSpPr>
+        <p:spPr>
+          <a:xfrm>
+            <a:off x="0" y="4297680"/>
+            <a:ext cx="9144000" cy="914400"/>
+          </a:xfrm>
+          <a:prstGeom prst="rect">
+            <a:avLst/>
+          </a:prstGeom>
+          <a:noFill/>
+          <a:ln/>
+        </p:spPr>
+        <p:txBody>
+          <a:bodyPr wrap="square" rtlCol="0"/>
+          <a:lstStyle/>
+          <a:p>
+            <a:pPr algn="ctr" indent="0" marL="0">
+              <a:buNone/>
+            </a:pPr>
+            <a:r>
+              <a:rPr lang="en-US" sz="2800" dirty="0">
+                <a:solidFill>
+                  <a:srgbClr val="548135"/>
+                </a:solidFill>
+              </a:rPr>
+              <a:t>1</a:t>
+            </a:r>
+            <a:endParaRPr lang="en-US" sz="2800" dirty="0"/>
+          </a:p>
+        </p:txBody>
+      </p:sp>
     </p:spTree>
   </p:cSld>
   <p:clrMapOvr>

</xml_diff>